<commit_message>
Angular PPT 15 bis
</commit_message>
<xml_diff>
--- a/ppt/angular/Angular05-Filters.pptx
+++ b/ppt/angular/Angular05-Filters.pptx
@@ -5,10 +5,10 @@
     <p:sldMasterId id="2147483653" r:id="rId1"/>
   </p:sldMasterIdLst>
   <p:notesMasterIdLst>
-    <p:notesMasterId r:id="rId7"/>
+    <p:notesMasterId r:id="rId9"/>
   </p:notesMasterIdLst>
   <p:handoutMasterIdLst>
-    <p:handoutMasterId r:id="rId8"/>
+    <p:handoutMasterId r:id="rId10"/>
   </p:handoutMasterIdLst>
   <p:sldIdLst>
     <p:sldId id="264" r:id="rId2"/>
@@ -16,6 +16,8 @@
     <p:sldId id="266" r:id="rId4"/>
     <p:sldId id="267" r:id="rId5"/>
     <p:sldId id="270" r:id="rId6"/>
+    <p:sldId id="271" r:id="rId7"/>
+    <p:sldId id="272" r:id="rId8"/>
   </p:sldIdLst>
   <p:sldSz cx="9144000" cy="6858000" type="screen4x3"/>
   <p:notesSz cx="6648450" cy="9782175"/>
@@ -3693,13 +3695,8 @@
             <a:pPr eaLnBrk="1" hangingPunct="1"/>
             <a:r>
               <a:rPr lang="fr-FR" altLang="fr-FR" dirty="0" smtClean="0"/>
-              <a:t>Chapitre </a:t>
-            </a:r>
-            <a:r>
-              <a:rPr lang="fr-FR" altLang="fr-FR" dirty="0" smtClean="0"/>
-              <a:t>5</a:t>
-            </a:r>
-            <a:endParaRPr lang="fr-FR" altLang="fr-FR" dirty="0" smtClean="0"/>
+              <a:t>Chapitre 5</a:t>
+            </a:r>
           </a:p>
           <a:p>
             <a:pPr eaLnBrk="1" hangingPunct="1"/>
@@ -4431,6 +4428,189 @@
       </p:par>
     </p:tnLst>
   </p:timing>
+</p:sld>
+</file>
+
+<file path=ppt/slides/slide6.xml><?xml version="1.0" encoding="utf-8"?>
+<p:sld xmlns:a="http://schemas.openxmlformats.org/drawingml/2006/main" xmlns:r="http://schemas.openxmlformats.org/officeDocument/2006/relationships" xmlns:p="http://schemas.openxmlformats.org/presentationml/2006/main">
+  <p:cSld>
+    <p:spTree>
+      <p:nvGrpSpPr>
+        <p:cNvPr id="1" name=""/>
+        <p:cNvGrpSpPr/>
+        <p:nvPr/>
+      </p:nvGrpSpPr>
+      <p:grpSpPr>
+        <a:xfrm>
+          <a:off x="0" y="0"/>
+          <a:ext cx="0" cy="0"/>
+          <a:chOff x="0" y="0"/>
+          <a:chExt cx="0" cy="0"/>
+        </a:xfrm>
+      </p:grpSpPr>
+      <p:sp>
+        <p:nvSpPr>
+          <p:cNvPr id="2" name="Titre 1"/>
+          <p:cNvSpPr>
+            <a:spLocks noGrp="1"/>
+          </p:cNvSpPr>
+          <p:nvPr>
+            <p:ph type="title"/>
+          </p:nvPr>
+        </p:nvSpPr>
+        <p:spPr/>
+        <p:txBody>
+          <a:bodyPr/>
+          <a:lstStyle/>
+          <a:p>
+            <a:r>
+              <a:rPr lang="fr-FR" dirty="0" smtClean="0"/>
+              <a:t>JSON</a:t>
+            </a:r>
+            <a:endParaRPr lang="fr-FR" dirty="0"/>
+          </a:p>
+        </p:txBody>
+      </p:sp>
+      <p:sp>
+        <p:nvSpPr>
+          <p:cNvPr id="3" name="Espace réservé du contenu 2"/>
+          <p:cNvSpPr>
+            <a:spLocks noGrp="1"/>
+          </p:cNvSpPr>
+          <p:nvPr>
+            <p:ph idx="1"/>
+          </p:nvPr>
+        </p:nvSpPr>
+        <p:spPr/>
+        <p:txBody>
+          <a:bodyPr/>
+          <a:lstStyle/>
+          <a:p>
+            <a:r>
+              <a:rPr lang="fr-FR" dirty="0" smtClean="0"/>
+              <a:t>Le </a:t>
+            </a:r>
+            <a:r>
+              <a:rPr lang="fr-FR" smtClean="0"/>
+              <a:t>filtre JSON </a:t>
+            </a:r>
+            <a:r>
+              <a:rPr lang="fr-FR" dirty="0" smtClean="0"/>
+              <a:t>permet la sérialisation JSON</a:t>
+            </a:r>
+          </a:p>
+          <a:p>
+            <a:pPr lvl="1"/>
+            <a:r>
+              <a:rPr lang="fr-FR" dirty="0"/>
+              <a:t>&lt;div&gt;{{</a:t>
+            </a:r>
+            <a:r>
+              <a:rPr lang="fr-FR" dirty="0" err="1"/>
+              <a:t>currentHero</a:t>
+            </a:r>
+            <a:r>
+              <a:rPr lang="fr-FR" dirty="0"/>
+              <a:t> | </a:t>
+            </a:r>
+            <a:r>
+              <a:rPr lang="fr-FR" dirty="0" err="1"/>
+              <a:t>json</a:t>
+            </a:r>
+            <a:r>
+              <a:rPr lang="fr-FR" dirty="0"/>
+              <a:t>}}&lt;/div&gt;</a:t>
+            </a:r>
+          </a:p>
+        </p:txBody>
+      </p:sp>
+    </p:spTree>
+    <p:extLst>
+      <p:ext uri="{BB962C8B-B14F-4D97-AF65-F5344CB8AC3E}">
+        <p14:creationId xmlns:p14="http://schemas.microsoft.com/office/powerpoint/2010/main" val="3243961841"/>
+      </p:ext>
+    </p:extLst>
+  </p:cSld>
+  <p:clrMapOvr>
+    <a:masterClrMapping/>
+  </p:clrMapOvr>
+</p:sld>
+</file>
+
+<file path=ppt/slides/slide7.xml><?xml version="1.0" encoding="utf-8"?>
+<p:sld xmlns:a="http://schemas.openxmlformats.org/drawingml/2006/main" xmlns:r="http://schemas.openxmlformats.org/officeDocument/2006/relationships" xmlns:p="http://schemas.openxmlformats.org/presentationml/2006/main">
+  <p:cSld>
+    <p:spTree>
+      <p:nvGrpSpPr>
+        <p:cNvPr id="1" name=""/>
+        <p:cNvGrpSpPr/>
+        <p:nvPr/>
+      </p:nvGrpSpPr>
+      <p:grpSpPr>
+        <a:xfrm>
+          <a:off x="0" y="0"/>
+          <a:ext cx="0" cy="0"/>
+          <a:chOff x="0" y="0"/>
+          <a:chExt cx="0" cy="0"/>
+        </a:xfrm>
+      </p:grpSpPr>
+      <p:sp>
+        <p:nvSpPr>
+          <p:cNvPr id="2" name="Titre 1"/>
+          <p:cNvSpPr>
+            <a:spLocks noGrp="1"/>
+          </p:cNvSpPr>
+          <p:nvPr>
+            <p:ph type="title"/>
+          </p:nvPr>
+        </p:nvSpPr>
+        <p:spPr/>
+        <p:txBody>
+          <a:bodyPr/>
+          <a:lstStyle/>
+          <a:p>
+            <a:r>
+              <a:rPr lang="fr-FR" dirty="0" smtClean="0"/>
+              <a:t>Création d'un filtre</a:t>
+            </a:r>
+            <a:endParaRPr lang="fr-FR" dirty="0"/>
+          </a:p>
+        </p:txBody>
+      </p:sp>
+      <p:pic>
+        <p:nvPicPr>
+          <p:cNvPr id="4" name="Image 3"/>
+          <p:cNvPicPr>
+            <a:picLocks noChangeAspect="1"/>
+          </p:cNvPicPr>
+          <p:nvPr/>
+        </p:nvPicPr>
+        <p:blipFill>
+          <a:blip r:embed="rId2"/>
+          <a:stretch>
+            <a:fillRect/>
+          </a:stretch>
+        </p:blipFill>
+        <p:spPr>
+          <a:xfrm>
+            <a:off x="1403648" y="1138435"/>
+            <a:ext cx="5760640" cy="5118064"/>
+          </a:xfrm>
+          <a:prstGeom prst="rect">
+            <a:avLst/>
+          </a:prstGeom>
+        </p:spPr>
+      </p:pic>
+    </p:spTree>
+    <p:extLst>
+      <p:ext uri="{BB962C8B-B14F-4D97-AF65-F5344CB8AC3E}">
+        <p14:creationId xmlns:p14="http://schemas.microsoft.com/office/powerpoint/2010/main" val="1642468585"/>
+      </p:ext>
+    </p:extLst>
+  </p:cSld>
+  <p:clrMapOvr>
+    <a:masterClrMapping/>
+  </p:clrMapOvr>
 </p:sld>
 </file>
 

</xml_diff>